<commit_message>
*) Updated presentation for cc
</commit_message>
<xml_diff>
--- a/3nd_sem/cc/le_gr_mu/01_Ex_Hm/Presentation/Enabling Technologies.pptx
+++ b/3nd_sem/cc/le_gr_mu/01_Ex_Hm/Presentation/Enabling Technologies.pptx
@@ -8,7 +8,7 @@
     <p:sldId id="256" r:id="rId2"/>
     <p:sldId id="257" r:id="rId3"/>
     <p:sldId id="258" r:id="rId4"/>
-    <p:sldId id="259" r:id="rId5"/>
+    <p:sldId id="263" r:id="rId5"/>
     <p:sldId id="260" r:id="rId6"/>
     <p:sldId id="261" r:id="rId7"/>
     <p:sldId id="262" r:id="rId8"/>
@@ -5993,6 +5993,25 @@
   <p:clrMapOvr>
     <a:masterClrMapping/>
   </p:clrMapOvr>
+  <mc:AlternateContent xmlns:mc="http://schemas.openxmlformats.org/markup-compatibility/2006">
+    <mc:Choice xmlns:p14="http://schemas.microsoft.com/office/powerpoint/2010/main" Requires="p14">
+      <p:transition spd="med" p14:dur="700">
+        <p:fade/>
+      </p:transition>
+    </mc:Choice>
+    <mc:Fallback>
+      <p:transition spd="med">
+        <p:fade/>
+      </p:transition>
+    </mc:Fallback>
+  </mc:AlternateContent>
+  <p:timing>
+    <p:tnLst>
+      <p:par>
+        <p:cTn id="1" dur="indefinite" restart="never" nodeType="tmRoot"/>
+      </p:par>
+    </p:tnLst>
+  </p:timing>
 </p:sld>
 </file>
 
@@ -6078,8 +6097,9 @@
           <a:p>
             <a:r>
               <a:rPr lang="de-AT" dirty="0" smtClean="0"/>
-              <a:t>WPF</a:t>
-            </a:r>
+              <a:t>.NET</a:t>
+            </a:r>
+            <a:endParaRPr lang="de-AT" dirty="0" smtClean="0"/>
           </a:p>
           <a:p>
             <a:endParaRPr lang="de-AT" dirty="0" smtClean="0"/>
@@ -6140,7 +6160,11 @@
           <a:p>
             <a:r>
               <a:rPr lang="de-AT" dirty="0" smtClean="0"/>
-              <a:t>Implementation Detail</a:t>
+              <a:t>Implementation </a:t>
+            </a:r>
+            <a:r>
+              <a:rPr lang="de-AT" dirty="0" smtClean="0"/>
+              <a:t>Detail - Service</a:t>
             </a:r>
             <a:endParaRPr lang="en-US" dirty="0"/>
           </a:p>
@@ -6161,10 +6185,69 @@
           <a:bodyPr/>
           <a:lstStyle/>
           <a:p>
-            <a:endParaRPr lang="en-US"/>
-          </a:p>
-        </p:txBody>
-      </p:sp>
+            <a:r>
+              <a:rPr lang="de-AT" dirty="0" err="1" smtClean="0"/>
+              <a:t>CloudMarketService</a:t>
+            </a:r>
+            <a:r>
+              <a:rPr lang="de-AT" dirty="0" smtClean="0"/>
+              <a:t> </a:t>
+            </a:r>
+          </a:p>
+          <a:p>
+            <a:pPr lvl="1"/>
+            <a:r>
+              <a:rPr lang="de-AT" dirty="0" smtClean="0"/>
+              <a:t>REST </a:t>
+            </a:r>
+            <a:r>
+              <a:rPr lang="de-AT" dirty="0" err="1" smtClean="0"/>
+              <a:t>based</a:t>
+            </a:r>
+            <a:endParaRPr lang="de-AT" dirty="0"/>
+          </a:p>
+          <a:p>
+            <a:pPr lvl="1"/>
+            <a:r>
+              <a:rPr lang="de-AT" dirty="0" err="1" smtClean="0"/>
+              <a:t>NodeJS</a:t>
+            </a:r>
+            <a:endParaRPr lang="de-AT" dirty="0" smtClean="0"/>
+          </a:p>
+          <a:p>
+            <a:pPr lvl="1"/>
+            <a:endParaRPr lang="de-AT" dirty="0"/>
+          </a:p>
+          <a:p>
+            <a:pPr lvl="1"/>
+            <a:endParaRPr lang="en-US" dirty="0"/>
+          </a:p>
+        </p:txBody>
+      </p:sp>
+      <p:pic>
+        <p:nvPicPr>
+          <p:cNvPr id="4" name="Grafik 3"/>
+          <p:cNvPicPr>
+            <a:picLocks noChangeAspect="1"/>
+          </p:cNvPicPr>
+          <p:nvPr/>
+        </p:nvPicPr>
+        <p:blipFill>
+          <a:blip r:embed="rId2"/>
+          <a:stretch>
+            <a:fillRect/>
+          </a:stretch>
+        </p:blipFill>
+        <p:spPr>
+          <a:xfrm>
+            <a:off x="1674216" y="3300289"/>
+            <a:ext cx="4993506" cy="3291840"/>
+          </a:xfrm>
+          <a:prstGeom prst="rect">
+            <a:avLst/>
+          </a:prstGeom>
+        </p:spPr>
+      </p:pic>
     </p:spTree>
     <p:extLst>
       <p:ext uri="{BB962C8B-B14F-4D97-AF65-F5344CB8AC3E}">
@@ -6212,7 +6295,11 @@
           <a:p>
             <a:r>
               <a:rPr lang="de-AT" dirty="0" smtClean="0"/>
-              <a:t>Interface Design</a:t>
+              <a:t>Implementation </a:t>
+            </a:r>
+            <a:r>
+              <a:rPr lang="de-AT" dirty="0" smtClean="0"/>
+              <a:t>Detail - Client</a:t>
             </a:r>
             <a:endParaRPr lang="en-US" dirty="0"/>
           </a:p>
@@ -6233,14 +6320,53 @@
           <a:bodyPr/>
           <a:lstStyle/>
           <a:p>
-            <a:endParaRPr lang="en-US"/>
-          </a:p>
-        </p:txBody>
-      </p:sp>
+            <a:r>
+              <a:rPr lang="de-AT" dirty="0" smtClean="0"/>
+              <a:t>.NET WPF Client</a:t>
+            </a:r>
+          </a:p>
+          <a:p>
+            <a:pPr marL="0" indent="0">
+              <a:buNone/>
+            </a:pPr>
+            <a:endParaRPr lang="de-AT" dirty="0" smtClean="0"/>
+          </a:p>
+          <a:p>
+            <a:pPr marL="457200" lvl="1" indent="0">
+              <a:buNone/>
+            </a:pPr>
+            <a:endParaRPr lang="en-US" dirty="0"/>
+          </a:p>
+        </p:txBody>
+      </p:sp>
+      <p:pic>
+        <p:nvPicPr>
+          <p:cNvPr id="4" name="Grafik 3"/>
+          <p:cNvPicPr>
+            <a:picLocks noChangeAspect="1"/>
+          </p:cNvPicPr>
+          <p:nvPr/>
+        </p:nvPicPr>
+        <p:blipFill>
+          <a:blip r:embed="rId2"/>
+          <a:stretch>
+            <a:fillRect/>
+          </a:stretch>
+        </p:blipFill>
+        <p:spPr>
+          <a:xfrm>
+            <a:off x="1571839" y="2607589"/>
+            <a:ext cx="6008541" cy="3840480"/>
+          </a:xfrm>
+          <a:prstGeom prst="rect">
+            <a:avLst/>
+          </a:prstGeom>
+        </p:spPr>
+      </p:pic>
     </p:spTree>
     <p:extLst>
       <p:ext uri="{BB962C8B-B14F-4D97-AF65-F5344CB8AC3E}">
-        <p14:creationId xmlns:p14="http://schemas.microsoft.com/office/powerpoint/2010/main" val="188286587"/>
+        <p14:creationId xmlns:p14="http://schemas.microsoft.com/office/powerpoint/2010/main" val="4100233697"/>
       </p:ext>
     </p:extLst>
   </p:cSld>
@@ -6300,12 +6426,538 @@
             <p:ph idx="1"/>
           </p:nvPr>
         </p:nvSpPr>
-        <p:spPr/>
-        <p:txBody>
-          <a:bodyPr/>
+        <p:spPr>
+          <a:xfrm>
+            <a:off x="1103312" y="1483448"/>
+            <a:ext cx="8946541" cy="4968370"/>
+          </a:xfrm>
+        </p:spPr>
+        <p:txBody>
+          <a:bodyPr>
+            <a:normAutofit fontScale="62500" lnSpcReduction="20000"/>
+          </a:bodyPr>
           <a:lstStyle/>
           <a:p>
-            <a:endParaRPr lang="en-US"/>
+            <a:r>
+              <a:rPr lang="de-AT" dirty="0" smtClean="0"/>
+              <a:t>REST Service</a:t>
+            </a:r>
+          </a:p>
+          <a:p>
+            <a:r>
+              <a:rPr lang="de-AT" dirty="0" smtClean="0"/>
+              <a:t>Request – Search </a:t>
+            </a:r>
+            <a:r>
+              <a:rPr lang="de-AT" dirty="0" err="1" smtClean="0"/>
+              <a:t>for</a:t>
+            </a:r>
+            <a:r>
+              <a:rPr lang="de-AT" dirty="0" smtClean="0"/>
+              <a:t> Virtual </a:t>
+            </a:r>
+            <a:r>
+              <a:rPr lang="de-AT" dirty="0" err="1" smtClean="0"/>
+              <a:t>Machine</a:t>
+            </a:r>
+            <a:r>
+              <a:rPr lang="de-AT" dirty="0" smtClean="0"/>
+              <a:t> </a:t>
+            </a:r>
+            <a:r>
+              <a:rPr lang="de-AT" dirty="0" err="1" smtClean="0"/>
+              <a:t>or</a:t>
+            </a:r>
+            <a:r>
+              <a:rPr lang="de-AT" dirty="0" smtClean="0"/>
+              <a:t> Appliance</a:t>
+            </a:r>
+          </a:p>
+          <a:p>
+            <a:pPr lvl="1"/>
+            <a:r>
+              <a:rPr lang="en-US" dirty="0"/>
+              <a:t>http://localhost:1337/machine/all/Virt</a:t>
+            </a:r>
+            <a:endParaRPr lang="de-AT" dirty="0" smtClean="0"/>
+          </a:p>
+          <a:p>
+            <a:pPr lvl="1"/>
+            <a:r>
+              <a:rPr lang="de-AT" dirty="0" smtClean="0"/>
+              <a:t>JSON </a:t>
+            </a:r>
+            <a:r>
+              <a:rPr lang="de-AT" dirty="0" err="1" smtClean="0"/>
+              <a:t>response</a:t>
+            </a:r>
+            <a:endParaRPr lang="de-AT" dirty="0" smtClean="0"/>
+          </a:p>
+          <a:p>
+            <a:pPr marL="857250" lvl="2" indent="0">
+              <a:buNone/>
+            </a:pPr>
+            <a:r>
+              <a:rPr lang="en-US" dirty="0" smtClean="0"/>
+              <a:t>{</a:t>
+            </a:r>
+            <a:r>
+              <a:rPr lang="en-US" dirty="0"/>
+              <a:t>  </a:t>
+            </a:r>
+            <a:br>
+              <a:rPr lang="en-US" dirty="0"/>
+            </a:br>
+            <a:r>
+              <a:rPr lang="en-US" dirty="0"/>
+              <a:t>   </a:t>
+            </a:r>
+            <a:r>
+              <a:rPr lang="en-US" b="1" dirty="0"/>
+              <a:t>"</a:t>
+            </a:r>
+            <a:r>
+              <a:rPr lang="en-US" b="1" dirty="0" err="1"/>
+              <a:t>Success"</a:t>
+            </a:r>
+            <a:r>
+              <a:rPr lang="en-US" dirty="0" err="1"/>
+              <a:t>:true</a:t>
+            </a:r>
+            <a:r>
+              <a:rPr lang="en-US" dirty="0"/>
+              <a:t>,</a:t>
+            </a:r>
+            <a:br>
+              <a:rPr lang="en-US" dirty="0"/>
+            </a:br>
+            <a:r>
+              <a:rPr lang="en-US" dirty="0"/>
+              <a:t>   </a:t>
+            </a:r>
+            <a:r>
+              <a:rPr lang="en-US" b="1" dirty="0"/>
+              <a:t>"</a:t>
+            </a:r>
+            <a:r>
+              <a:rPr lang="en-US" b="1" dirty="0" err="1"/>
+              <a:t>ErrorMessage</a:t>
+            </a:r>
+            <a:r>
+              <a:rPr lang="en-US" b="1" dirty="0"/>
+              <a:t>"</a:t>
+            </a:r>
+            <a:r>
+              <a:rPr lang="en-US" dirty="0"/>
+              <a:t>:"",</a:t>
+            </a:r>
+            <a:br>
+              <a:rPr lang="en-US" dirty="0"/>
+            </a:br>
+            <a:r>
+              <a:rPr lang="en-US" dirty="0"/>
+              <a:t>   </a:t>
+            </a:r>
+            <a:r>
+              <a:rPr lang="en-US" b="1" dirty="0"/>
+              <a:t>"Data"</a:t>
+            </a:r>
+            <a:r>
+              <a:rPr lang="en-US" dirty="0"/>
+              <a:t>:[  </a:t>
+            </a:r>
+            <a:br>
+              <a:rPr lang="en-US" dirty="0"/>
+            </a:br>
+            <a:r>
+              <a:rPr lang="en-US" dirty="0"/>
+              <a:t>      {  </a:t>
+            </a:r>
+            <a:br>
+              <a:rPr lang="en-US" dirty="0"/>
+            </a:br>
+            <a:r>
+              <a:rPr lang="en-US" dirty="0"/>
+              <a:t>         </a:t>
+            </a:r>
+            <a:r>
+              <a:rPr lang="en-US" b="1" dirty="0"/>
+              <a:t>"Id"</a:t>
+            </a:r>
+            <a:r>
+              <a:rPr lang="en-US" dirty="0"/>
+              <a:t>:"3",</a:t>
+            </a:r>
+            <a:br>
+              <a:rPr lang="en-US" dirty="0"/>
+            </a:br>
+            <a:r>
+              <a:rPr lang="en-US" dirty="0"/>
+              <a:t>         </a:t>
+            </a:r>
+            <a:r>
+              <a:rPr lang="en-US" b="1" dirty="0"/>
+              <a:t>"</a:t>
+            </a:r>
+            <a:r>
+              <a:rPr lang="en-US" b="1" dirty="0" err="1"/>
+              <a:t>Name"</a:t>
+            </a:r>
+            <a:r>
+              <a:rPr lang="en-US" dirty="0" err="1"/>
+              <a:t>:"Windows</a:t>
+            </a:r>
+            <a:r>
+              <a:rPr lang="en-US" dirty="0"/>
+              <a:t> XP",</a:t>
+            </a:r>
+            <a:br>
+              <a:rPr lang="en-US" dirty="0"/>
+            </a:br>
+            <a:r>
+              <a:rPr lang="en-US" dirty="0"/>
+              <a:t>         </a:t>
+            </a:r>
+            <a:r>
+              <a:rPr lang="en-US" b="1" dirty="0"/>
+              <a:t>"</a:t>
+            </a:r>
+            <a:r>
+              <a:rPr lang="en-US" b="1" dirty="0" err="1"/>
+              <a:t>Description"</a:t>
+            </a:r>
+            <a:r>
+              <a:rPr lang="en-US" dirty="0" err="1"/>
+              <a:t>:"Windows</a:t>
+            </a:r>
+            <a:r>
+              <a:rPr lang="en-US" dirty="0"/>
+              <a:t> XP Service Pack 3",</a:t>
+            </a:r>
+            <a:br>
+              <a:rPr lang="en-US" dirty="0"/>
+            </a:br>
+            <a:r>
+              <a:rPr lang="en-US" dirty="0"/>
+              <a:t>         </a:t>
+            </a:r>
+            <a:r>
+              <a:rPr lang="en-US" b="1" dirty="0"/>
+              <a:t>"</a:t>
+            </a:r>
+            <a:r>
+              <a:rPr lang="en-US" b="1" dirty="0" err="1"/>
+              <a:t>Type"</a:t>
+            </a:r>
+            <a:r>
+              <a:rPr lang="en-US" dirty="0" err="1"/>
+              <a:t>:"Virtual</a:t>
+            </a:r>
+            <a:r>
+              <a:rPr lang="en-US" dirty="0"/>
+              <a:t> Machine",</a:t>
+            </a:r>
+            <a:br>
+              <a:rPr lang="en-US" dirty="0"/>
+            </a:br>
+            <a:r>
+              <a:rPr lang="en-US" dirty="0"/>
+              <a:t>         </a:t>
+            </a:r>
+            <a:r>
+              <a:rPr lang="en-US" b="1" dirty="0"/>
+              <a:t>"</a:t>
+            </a:r>
+            <a:r>
+              <a:rPr lang="en-US" b="1" dirty="0" err="1"/>
+              <a:t>ApplicationType</a:t>
+            </a:r>
+            <a:r>
+              <a:rPr lang="en-US" b="1" dirty="0"/>
+              <a:t>"</a:t>
+            </a:r>
+            <a:r>
+              <a:rPr lang="en-US" dirty="0"/>
+              <a:t>:"",</a:t>
+            </a:r>
+            <a:br>
+              <a:rPr lang="en-US" dirty="0"/>
+            </a:br>
+            <a:r>
+              <a:rPr lang="en-US" dirty="0"/>
+              <a:t>         </a:t>
+            </a:r>
+            <a:r>
+              <a:rPr lang="en-US" b="1" dirty="0"/>
+              <a:t>"</a:t>
+            </a:r>
+            <a:r>
+              <a:rPr lang="en-US" b="1" dirty="0" err="1"/>
+              <a:t>OperatingSystem</a:t>
+            </a:r>
+            <a:r>
+              <a:rPr lang="en-US" b="1" dirty="0"/>
+              <a:t>"</a:t>
+            </a:r>
+            <a:r>
+              <a:rPr lang="en-US" dirty="0"/>
+              <a:t>:"Windows XP",</a:t>
+            </a:r>
+            <a:br>
+              <a:rPr lang="en-US" dirty="0"/>
+            </a:br>
+            <a:r>
+              <a:rPr lang="en-US" dirty="0"/>
+              <a:t>         </a:t>
+            </a:r>
+            <a:r>
+              <a:rPr lang="en-US" b="1" dirty="0"/>
+              <a:t>"</a:t>
+            </a:r>
+            <a:r>
+              <a:rPr lang="en-US" b="1" dirty="0" err="1"/>
+              <a:t>OperatingSystemType</a:t>
+            </a:r>
+            <a:r>
+              <a:rPr lang="en-US" b="1" dirty="0"/>
+              <a:t>"</a:t>
+            </a:r>
+            <a:r>
+              <a:rPr lang="en-US" dirty="0"/>
+              <a:t>:"Windows",</a:t>
+            </a:r>
+            <a:br>
+              <a:rPr lang="en-US" dirty="0"/>
+            </a:br>
+            <a:r>
+              <a:rPr lang="en-US" dirty="0"/>
+              <a:t>         </a:t>
+            </a:r>
+            <a:r>
+              <a:rPr lang="en-US" b="1" dirty="0"/>
+              <a:t>"OperatingSysteVersion"</a:t>
+            </a:r>
+            <a:r>
+              <a:rPr lang="en-US" dirty="0"/>
+              <a:t>:"6.1",</a:t>
+            </a:r>
+            <a:br>
+              <a:rPr lang="en-US" dirty="0"/>
+            </a:br>
+            <a:r>
+              <a:rPr lang="en-US" dirty="0"/>
+              <a:t>         </a:t>
+            </a:r>
+            <a:r>
+              <a:rPr lang="en-US" b="1" dirty="0"/>
+              <a:t>"Size"</a:t>
+            </a:r>
+            <a:r>
+              <a:rPr lang="en-US" dirty="0"/>
+              <a:t>:"400000",</a:t>
+            </a:r>
+            <a:br>
+              <a:rPr lang="en-US" dirty="0"/>
+            </a:br>
+            <a:r>
+              <a:rPr lang="en-US" dirty="0"/>
+              <a:t>         </a:t>
+            </a:r>
+            <a:r>
+              <a:rPr lang="en-US" b="1" dirty="0"/>
+              <a:t>"RecommendedCPU"</a:t>
+            </a:r>
+            <a:r>
+              <a:rPr lang="en-US" dirty="0"/>
+              <a:t>:"1000",</a:t>
+            </a:r>
+            <a:br>
+              <a:rPr lang="en-US" dirty="0"/>
+            </a:br>
+            <a:r>
+              <a:rPr lang="en-US" dirty="0"/>
+              <a:t>         </a:t>
+            </a:r>
+            <a:r>
+              <a:rPr lang="en-US" b="1" dirty="0"/>
+              <a:t>"RecommendedRAM"</a:t>
+            </a:r>
+            <a:r>
+              <a:rPr lang="en-US" dirty="0"/>
+              <a:t>:"1024",</a:t>
+            </a:r>
+            <a:br>
+              <a:rPr lang="en-US" dirty="0"/>
+            </a:br>
+            <a:r>
+              <a:rPr lang="en-US" dirty="0"/>
+              <a:t>         </a:t>
+            </a:r>
+            <a:r>
+              <a:rPr lang="en-US" b="1" dirty="0"/>
+              <a:t>"</a:t>
+            </a:r>
+            <a:r>
+              <a:rPr lang="en-US" b="1" dirty="0" err="1"/>
+              <a:t>SupportedVirtualizationPlatform</a:t>
+            </a:r>
+            <a:r>
+              <a:rPr lang="en-US" b="1" dirty="0"/>
+              <a:t>"</a:t>
+            </a:r>
+            <a:r>
+              <a:rPr lang="en-US" dirty="0"/>
+              <a:t>:"",</a:t>
+            </a:r>
+            <a:br>
+              <a:rPr lang="en-US" dirty="0"/>
+            </a:br>
+            <a:r>
+              <a:rPr lang="en-US" dirty="0"/>
+              <a:t>         </a:t>
+            </a:r>
+            <a:r>
+              <a:rPr lang="en-US" b="1" dirty="0"/>
+              <a:t>"Software"</a:t>
+            </a:r>
+            <a:r>
+              <a:rPr lang="en-US" dirty="0"/>
+              <a:t>:[  </a:t>
+            </a:r>
+            <a:br>
+              <a:rPr lang="en-US" dirty="0"/>
+            </a:br>
+            <a:r>
+              <a:rPr lang="en-US" dirty="0"/>
+              <a:t/>
+            </a:r>
+            <a:br>
+              <a:rPr lang="en-US" dirty="0"/>
+            </a:br>
+            <a:r>
+              <a:rPr lang="en-US" dirty="0"/>
+              <a:t>         ],</a:t>
+            </a:r>
+            <a:br>
+              <a:rPr lang="en-US" dirty="0"/>
+            </a:br>
+            <a:r>
+              <a:rPr lang="en-US" dirty="0"/>
+              <a:t>         </a:t>
+            </a:r>
+            <a:r>
+              <a:rPr lang="en-US" b="1" dirty="0"/>
+              <a:t>"</a:t>
+            </a:r>
+            <a:r>
+              <a:rPr lang="en-US" b="1" dirty="0" err="1"/>
+              <a:t>SupportedProgramingLanguages</a:t>
+            </a:r>
+            <a:r>
+              <a:rPr lang="en-US" b="1" dirty="0"/>
+              <a:t>"</a:t>
+            </a:r>
+            <a:r>
+              <a:rPr lang="en-US" dirty="0"/>
+              <a:t>:[  </a:t>
+            </a:r>
+            <a:br>
+              <a:rPr lang="en-US" dirty="0"/>
+            </a:br>
+            <a:r>
+              <a:rPr lang="en-US" dirty="0"/>
+              <a:t/>
+            </a:r>
+            <a:br>
+              <a:rPr lang="en-US" dirty="0"/>
+            </a:br>
+            <a:r>
+              <a:rPr lang="en-US" dirty="0"/>
+              <a:t>         ],</a:t>
+            </a:r>
+            <a:br>
+              <a:rPr lang="en-US" dirty="0"/>
+            </a:br>
+            <a:r>
+              <a:rPr lang="en-US" dirty="0"/>
+              <a:t>         </a:t>
+            </a:r>
+            <a:r>
+              <a:rPr lang="en-US" b="1" dirty="0"/>
+              <a:t>"Rating"</a:t>
+            </a:r>
+            <a:r>
+              <a:rPr lang="en-US" dirty="0"/>
+              <a:t>:"",</a:t>
+            </a:r>
+            <a:br>
+              <a:rPr lang="en-US" dirty="0"/>
+            </a:br>
+            <a:r>
+              <a:rPr lang="en-US" dirty="0"/>
+              <a:t>         </a:t>
+            </a:r>
+            <a:r>
+              <a:rPr lang="en-US" b="1" dirty="0"/>
+              <a:t>"</a:t>
+            </a:r>
+            <a:r>
+              <a:rPr lang="en-US" b="1" dirty="0" err="1"/>
+              <a:t>RatingDescription</a:t>
+            </a:r>
+            <a:r>
+              <a:rPr lang="en-US" b="1" dirty="0"/>
+              <a:t>"</a:t>
+            </a:r>
+            <a:r>
+              <a:rPr lang="en-US" dirty="0"/>
+              <a:t>:"",</a:t>
+            </a:r>
+            <a:br>
+              <a:rPr lang="en-US" dirty="0"/>
+            </a:br>
+            <a:r>
+              <a:rPr lang="en-US" dirty="0"/>
+              <a:t>         </a:t>
+            </a:r>
+            <a:r>
+              <a:rPr lang="en-US" b="1" dirty="0"/>
+              <a:t>"</a:t>
+            </a:r>
+            <a:r>
+              <a:rPr lang="en-US" b="1" dirty="0" err="1"/>
+              <a:t>Status"</a:t>
+            </a:r>
+            <a:r>
+              <a:rPr lang="en-US" dirty="0" err="1"/>
+              <a:t>:"Stopped</a:t>
+            </a:r>
+            <a:r>
+              <a:rPr lang="en-US" dirty="0"/>
+              <a:t>"</a:t>
+            </a:r>
+            <a:br>
+              <a:rPr lang="en-US" dirty="0"/>
+            </a:br>
+            <a:r>
+              <a:rPr lang="en-US" dirty="0"/>
+              <a:t>      }</a:t>
+            </a:r>
+            <a:br>
+              <a:rPr lang="en-US" dirty="0"/>
+            </a:br>
+            <a:r>
+              <a:rPr lang="en-US" dirty="0"/>
+              <a:t>   ]</a:t>
+            </a:r>
+            <a:br>
+              <a:rPr lang="en-US" dirty="0"/>
+            </a:br>
+            <a:r>
+              <a:rPr lang="en-US" dirty="0"/>
+              <a:t>}</a:t>
+            </a:r>
+            <a:endParaRPr lang="en-US" dirty="0"/>
           </a:p>
         </p:txBody>
       </p:sp>
@@ -6385,7 +7037,43 @@
           <a:bodyPr/>
           <a:lstStyle/>
           <a:p>
-            <a:endParaRPr lang="en-US"/>
+            <a:r>
+              <a:rPr lang="de-AT" dirty="0" err="1" smtClean="0"/>
+              <a:t>Use</a:t>
+            </a:r>
+            <a:r>
+              <a:rPr lang="de-AT" dirty="0" smtClean="0"/>
+              <a:t> </a:t>
+            </a:r>
+            <a:r>
+              <a:rPr lang="de-AT" dirty="0" err="1" smtClean="0"/>
+              <a:t>DevStack</a:t>
+            </a:r>
+            <a:r>
+              <a:rPr lang="de-AT" dirty="0" smtClean="0"/>
+              <a:t> </a:t>
+            </a:r>
+            <a:r>
+              <a:rPr lang="de-AT" dirty="0" err="1" smtClean="0"/>
+              <a:t>for</a:t>
+            </a:r>
+            <a:r>
+              <a:rPr lang="de-AT" dirty="0" smtClean="0"/>
+              <a:t> a </a:t>
+            </a:r>
+            <a:r>
+              <a:rPr lang="de-AT" dirty="0" err="1" smtClean="0"/>
+              <a:t>single</a:t>
+            </a:r>
+            <a:r>
+              <a:rPr lang="de-AT" dirty="0" smtClean="0"/>
+              <a:t> </a:t>
+            </a:r>
+            <a:r>
+              <a:rPr lang="de-AT" dirty="0" err="1" smtClean="0"/>
+              <a:t>machine</a:t>
+            </a:r>
+            <a:endParaRPr lang="en-US" dirty="0"/>
           </a:p>
         </p:txBody>
       </p:sp>

</xml_diff>

<commit_message>
+) Udpate cc presentation
</commit_message>
<xml_diff>
--- a/3nd_sem/cc/le_gr_mu/01_Ex_Hm/Presentation/Enabling Technologies.pptx
+++ b/3nd_sem/cc/le_gr_mu/01_Ex_Hm/Presentation/Enabling Technologies.pptx
@@ -10,8 +10,9 @@
     <p:sldId id="258" r:id="rId4"/>
     <p:sldId id="263" r:id="rId5"/>
     <p:sldId id="260" r:id="rId6"/>
-    <p:sldId id="261" r:id="rId7"/>
-    <p:sldId id="262" r:id="rId8"/>
+    <p:sldId id="264" r:id="rId7"/>
+    <p:sldId id="261" r:id="rId8"/>
+    <p:sldId id="265" r:id="rId9"/>
   </p:sldIdLst>
   <p:sldSz cx="12192000" cy="6858000"/>
   <p:notesSz cx="6858000" cy="9144000"/>
@@ -112,7 +113,7 @@
   </p:defaultTextStyle>
   <p:extLst>
     <p:ext uri="{EFAFB233-063F-42B5-8137-9DF3F51BA10A}">
-      <p15:sldGuideLst xmlns:p15="http://schemas.microsoft.com/office/powerpoint/2012/main"/>
+      <p15:sldGuideLst xmlns:p15="http://schemas.microsoft.com/office/powerpoint/2012/main" xmlns=""/>
     </p:ext>
   </p:extLst>
 </p:presentation>
@@ -5993,13 +5994,13 @@
   <p:clrMapOvr>
     <a:masterClrMapping/>
   </p:clrMapOvr>
-  <mc:AlternateContent xmlns:mc="http://schemas.openxmlformats.org/markup-compatibility/2006">
-    <mc:Choice xmlns:p14="http://schemas.microsoft.com/office/powerpoint/2010/main" Requires="p14">
+  <mc:AlternateContent xmlns:mc="http://schemas.openxmlformats.org/markup-compatibility/2006" xmlns:p14="http://schemas.microsoft.com/office/powerpoint/2010/main">
+    <mc:Choice Requires="p14">
       <p:transition spd="med" p14:dur="700">
         <p:fade/>
       </p:transition>
     </mc:Choice>
-    <mc:Fallback>
+    <mc:Fallback xmlns="">
       <p:transition spd="med">
         <p:fade/>
       </p:transition>
@@ -6099,7 +6100,6 @@
               <a:rPr lang="de-AT" dirty="0" smtClean="0"/>
               <a:t>.NET</a:t>
             </a:r>
-            <a:endParaRPr lang="de-AT" dirty="0" smtClean="0"/>
           </a:p>
           <a:p>
             <a:endParaRPr lang="de-AT" dirty="0" smtClean="0"/>
@@ -6123,6 +6123,13 @@
   <p:clrMapOvr>
     <a:masterClrMapping/>
   </p:clrMapOvr>
+  <p:timing>
+    <p:tnLst>
+      <p:par>
+        <p:cTn id="1" dur="indefinite" restart="never" nodeType="tmRoot"/>
+      </p:par>
+    </p:tnLst>
+  </p:timing>
 </p:sld>
 </file>
 
@@ -6160,11 +6167,7 @@
           <a:p>
             <a:r>
               <a:rPr lang="de-AT" dirty="0" smtClean="0"/>
-              <a:t>Implementation </a:t>
-            </a:r>
-            <a:r>
-              <a:rPr lang="de-AT" dirty="0" smtClean="0"/>
-              <a:t>Detail - Service</a:t>
+              <a:t>Implementation Detail - Service</a:t>
             </a:r>
             <a:endParaRPr lang="en-US" dirty="0"/>
           </a:p>
@@ -6258,6 +6261,13 @@
   <p:clrMapOvr>
     <a:masterClrMapping/>
   </p:clrMapOvr>
+  <p:timing>
+    <p:tnLst>
+      <p:par>
+        <p:cTn id="1" dur="indefinite" restart="never" nodeType="tmRoot"/>
+      </p:par>
+    </p:tnLst>
+  </p:timing>
 </p:sld>
 </file>
 
@@ -6295,11 +6305,7 @@
           <a:p>
             <a:r>
               <a:rPr lang="de-AT" dirty="0" smtClean="0"/>
-              <a:t>Implementation </a:t>
-            </a:r>
-            <a:r>
-              <a:rPr lang="de-AT" dirty="0" smtClean="0"/>
-              <a:t>Detail - Client</a:t>
+              <a:t>Implementation Detail - Client</a:t>
             </a:r>
             <a:endParaRPr lang="en-US" dirty="0"/>
           </a:p>
@@ -6373,6 +6379,13 @@
   <p:clrMapOvr>
     <a:masterClrMapping/>
   </p:clrMapOvr>
+  <p:timing>
+    <p:tnLst>
+      <p:par>
+        <p:cTn id="1" dur="indefinite" restart="never" nodeType="tmRoot"/>
+      </p:par>
+    </p:tnLst>
+  </p:timing>
 </p:sld>
 </file>
 
@@ -6957,7 +6970,6 @@
               <a:rPr lang="en-US" dirty="0"/>
               <a:t>}</a:t>
             </a:r>
-            <a:endParaRPr lang="en-US" dirty="0"/>
           </a:p>
         </p:txBody>
       </p:sp>
@@ -6971,6 +6983,13 @@
   <p:clrMapOvr>
     <a:masterClrMapping/>
   </p:clrMapOvr>
+  <p:timing>
+    <p:tnLst>
+      <p:par>
+        <p:cTn id="1" dur="indefinite" restart="never" nodeType="tmRoot"/>
+      </p:par>
+    </p:tnLst>
+  </p:timing>
 </p:sld>
 </file>
 
@@ -7007,18 +7026,10 @@
           <a:lstStyle/>
           <a:p>
             <a:r>
-              <a:rPr lang="de-AT" dirty="0" err="1" smtClean="0"/>
-              <a:t>Lessons</a:t>
-            </a:r>
-            <a:r>
               <a:rPr lang="de-AT" dirty="0" smtClean="0"/>
-              <a:t> </a:t>
-            </a:r>
-            <a:r>
-              <a:rPr lang="de-AT" dirty="0" err="1" smtClean="0"/>
-              <a:t>Learned</a:t>
-            </a:r>
-            <a:endParaRPr lang="en-US" dirty="0"/>
+              <a:t>Problems</a:t>
+            </a:r>
+            <a:endParaRPr lang="de-AT" dirty="0"/>
           </a:p>
         </p:txBody>
       </p:sp>
@@ -7037,56 +7048,75 @@
           <a:bodyPr/>
           <a:lstStyle/>
           <a:p>
-            <a:r>
-              <a:rPr lang="de-AT" dirty="0" err="1" smtClean="0"/>
-              <a:t>Use</a:t>
-            </a:r>
-            <a:r>
-              <a:rPr lang="de-AT" dirty="0" smtClean="0"/>
-              <a:t> </a:t>
-            </a:r>
-            <a:r>
-              <a:rPr lang="de-AT" dirty="0" err="1" smtClean="0"/>
-              <a:t>DevStack</a:t>
-            </a:r>
-            <a:r>
-              <a:rPr lang="de-AT" dirty="0" smtClean="0"/>
-              <a:t> </a:t>
-            </a:r>
-            <a:r>
-              <a:rPr lang="de-AT" dirty="0" err="1" smtClean="0"/>
-              <a:t>for</a:t>
-            </a:r>
-            <a:r>
-              <a:rPr lang="de-AT" dirty="0" smtClean="0"/>
-              <a:t> a </a:t>
-            </a:r>
-            <a:r>
-              <a:rPr lang="de-AT" dirty="0" err="1" smtClean="0"/>
-              <a:t>single</a:t>
-            </a:r>
-            <a:r>
-              <a:rPr lang="de-AT" dirty="0" smtClean="0"/>
-              <a:t> </a:t>
-            </a:r>
-            <a:r>
-              <a:rPr lang="de-AT" dirty="0" err="1" smtClean="0"/>
-              <a:t>machine</a:t>
-            </a:r>
-            <a:endParaRPr lang="en-US" dirty="0"/>
+            <a:endParaRPr lang="en-AU" dirty="0" smtClean="0"/>
+          </a:p>
+          <a:p>
+            <a:endParaRPr lang="en-AU" dirty="0"/>
+          </a:p>
+          <a:p>
+            <a:r>
+              <a:rPr lang="en-AU" dirty="0" err="1" smtClean="0"/>
+              <a:t>Debian</a:t>
+            </a:r>
+            <a:r>
+              <a:rPr lang="en-AU" dirty="0" smtClean="0"/>
+              <a:t> – not really supported</a:t>
+            </a:r>
+          </a:p>
+          <a:p>
+            <a:endParaRPr lang="en-AU" dirty="0" smtClean="0"/>
+          </a:p>
+          <a:p>
+            <a:r>
+              <a:rPr lang="en-AU" dirty="0" smtClean="0"/>
+              <a:t>Documentation is confusing</a:t>
+            </a:r>
+          </a:p>
+          <a:p>
+            <a:endParaRPr lang="en-AU" dirty="0"/>
+          </a:p>
+          <a:p>
+            <a:r>
+              <a:rPr lang="en-AU" dirty="0" smtClean="0"/>
+              <a:t>Step by step guide for configuring </a:t>
+            </a:r>
+            <a:r>
+              <a:rPr lang="en-AU" dirty="0" err="1" smtClean="0"/>
+              <a:t>Openstack</a:t>
+            </a:r>
+            <a:r>
+              <a:rPr lang="en-AU" dirty="0" smtClean="0"/>
+              <a:t> is not working</a:t>
+            </a:r>
+          </a:p>
+          <a:p>
+            <a:endParaRPr lang="en-AU" dirty="0" smtClean="0"/>
+          </a:p>
+          <a:p>
+            <a:endParaRPr lang="en-AU" dirty="0"/>
+          </a:p>
+          <a:p>
+            <a:endParaRPr lang="en-AU" dirty="0"/>
           </a:p>
         </p:txBody>
       </p:sp>
     </p:spTree>
     <p:extLst>
       <p:ext uri="{BB962C8B-B14F-4D97-AF65-F5344CB8AC3E}">
-        <p14:creationId xmlns:p14="http://schemas.microsoft.com/office/powerpoint/2010/main" val="4010221595"/>
+        <p14:creationId xmlns:p14="http://schemas.microsoft.com/office/powerpoint/2010/main" val="3899936956"/>
       </p:ext>
     </p:extLst>
   </p:cSld>
   <p:clrMapOvr>
     <a:masterClrMapping/>
   </p:clrMapOvr>
+  <p:timing>
+    <p:tnLst>
+      <p:par>
+        <p:cTn id="1" dur="indefinite" restart="never" nodeType="tmRoot"/>
+      </p:par>
+    </p:tnLst>
+  </p:timing>
 </p:sld>
 </file>
 
@@ -7123,8 +7153,16 @@
           <a:lstStyle/>
           <a:p>
             <a:r>
+              <a:rPr lang="de-AT" dirty="0" err="1" smtClean="0"/>
+              <a:t>Lessons</a:t>
+            </a:r>
+            <a:r>
               <a:rPr lang="de-AT" dirty="0" smtClean="0"/>
-              <a:t>Demo</a:t>
+              <a:t> </a:t>
+            </a:r>
+            <a:r>
+              <a:rPr lang="de-AT" dirty="0" err="1" smtClean="0"/>
+              <a:t>Learned</a:t>
             </a:r>
             <a:endParaRPr lang="en-US" dirty="0"/>
           </a:p>
@@ -7145,20 +7183,130 @@
           <a:bodyPr/>
           <a:lstStyle/>
           <a:p>
-            <a:endParaRPr lang="en-US"/>
+            <a:endParaRPr lang="en-AU" dirty="0" smtClean="0"/>
+          </a:p>
+          <a:p>
+            <a:endParaRPr lang="en-AU" dirty="0" smtClean="0"/>
+          </a:p>
+          <a:p>
+            <a:endParaRPr lang="en-AU" dirty="0" smtClean="0"/>
+          </a:p>
+          <a:p>
+            <a:r>
+              <a:rPr lang="en-AU" dirty="0" smtClean="0"/>
+              <a:t>Use </a:t>
+            </a:r>
+            <a:r>
+              <a:rPr lang="en-AU" dirty="0" err="1" smtClean="0"/>
+              <a:t>DevStack</a:t>
+            </a:r>
+            <a:r>
+              <a:rPr lang="en-AU" dirty="0" smtClean="0"/>
+              <a:t> for a single machine</a:t>
+            </a:r>
+          </a:p>
+          <a:p>
+            <a:endParaRPr lang="en-AU" dirty="0" smtClean="0"/>
+          </a:p>
+          <a:p>
+            <a:r>
+              <a:rPr lang="en-AU" dirty="0" smtClean="0"/>
+              <a:t>Design </a:t>
+            </a:r>
+            <a:r>
+              <a:rPr lang="en-AU" smtClean="0"/>
+              <a:t>suitable message </a:t>
+            </a:r>
+            <a:r>
+              <a:rPr lang="en-AU" dirty="0" smtClean="0"/>
+              <a:t>format</a:t>
+            </a:r>
           </a:p>
         </p:txBody>
       </p:sp>
     </p:spTree>
     <p:extLst>
       <p:ext uri="{BB962C8B-B14F-4D97-AF65-F5344CB8AC3E}">
-        <p14:creationId xmlns:p14="http://schemas.microsoft.com/office/powerpoint/2010/main" val="2039331800"/>
+        <p14:creationId xmlns:p14="http://schemas.microsoft.com/office/powerpoint/2010/main" val="4010221595"/>
       </p:ext>
     </p:extLst>
   </p:cSld>
   <p:clrMapOvr>
     <a:masterClrMapping/>
   </p:clrMapOvr>
+  <p:timing>
+    <p:tnLst>
+      <p:par>
+        <p:cTn id="1" dur="indefinite" restart="never" nodeType="tmRoot"/>
+      </p:par>
+    </p:tnLst>
+  </p:timing>
+</p:sld>
+</file>
+
+<file path=ppt/slides/slide8.xml><?xml version="1.0" encoding="utf-8"?>
+<p:sld xmlns:a="http://schemas.openxmlformats.org/drawingml/2006/main" xmlns:r="http://schemas.openxmlformats.org/officeDocument/2006/relationships" xmlns:p="http://schemas.openxmlformats.org/presentationml/2006/main">
+  <p:cSld>
+    <p:spTree>
+      <p:nvGrpSpPr>
+        <p:cNvPr id="1" name=""/>
+        <p:cNvGrpSpPr/>
+        <p:nvPr/>
+      </p:nvGrpSpPr>
+      <p:grpSpPr>
+        <a:xfrm>
+          <a:off x="0" y="0"/>
+          <a:ext cx="0" cy="0"/>
+          <a:chOff x="0" y="0"/>
+          <a:chExt cx="0" cy="0"/>
+        </a:xfrm>
+      </p:grpSpPr>
+      <p:sp>
+        <p:nvSpPr>
+          <p:cNvPr id="2" name="Titel 1"/>
+          <p:cNvSpPr>
+            <a:spLocks noGrp="1"/>
+          </p:cNvSpPr>
+          <p:nvPr>
+            <p:ph type="title"/>
+          </p:nvPr>
+        </p:nvSpPr>
+        <p:spPr>
+          <a:xfrm>
+            <a:off x="1399329" y="2711642"/>
+            <a:ext cx="8825657" cy="1182842"/>
+          </a:xfrm>
+        </p:spPr>
+        <p:txBody>
+          <a:bodyPr/>
+          <a:lstStyle/>
+          <a:p>
+            <a:pPr algn="ctr"/>
+            <a:r>
+              <a:rPr lang="de-AT" sz="6000" dirty="0" smtClean="0"/>
+              <a:t>DEMO</a:t>
+            </a:r>
+            <a:endParaRPr lang="de-AT" sz="6000" dirty="0"/>
+          </a:p>
+        </p:txBody>
+      </p:sp>
+    </p:spTree>
+    <p:extLst>
+      <p:ext uri="{BB962C8B-B14F-4D97-AF65-F5344CB8AC3E}">
+        <p14:creationId xmlns:p14="http://schemas.microsoft.com/office/powerpoint/2010/main" val="2110012689"/>
+      </p:ext>
+    </p:extLst>
+  </p:cSld>
+  <p:clrMapOvr>
+    <a:masterClrMapping/>
+  </p:clrMapOvr>
+  <p:timing>
+    <p:tnLst>
+      <p:par>
+        <p:cTn id="1" dur="indefinite" restart="never" nodeType="tmRoot"/>
+      </p:par>
+    </p:tnLst>
+  </p:timing>
 </p:sld>
 </file>
 
@@ -7421,7 +7569,7 @@
   <a:extraClrSchemeLst/>
   <a:extLst>
     <a:ext uri="{05A4C25C-085E-4340-85A3-A5531E510DB2}">
-      <thm15:themeFamily xmlns:thm15="http://schemas.microsoft.com/office/thememl/2012/main" name="Ion" id="{B8441ADB-2E43-4AF7-B97A-BD870242C6A8}" vid="{BACC050B-8757-4460-95D8-E37B46A6B421}"/>
+      <thm15:themeFamily xmlns:thm15="http://schemas.microsoft.com/office/thememl/2012/main" xmlns="" name="Ion" id="{B8441ADB-2E43-4AF7-B97A-BD870242C6A8}" vid="{BACC050B-8757-4460-95D8-E37B46A6B421}"/>
     </a:ext>
   </a:extLst>
 </a:theme>

</xml_diff>